<commit_message>
ajout partie neo4j dans la doc
</commit_message>
<xml_diff>
--- a/documentation/présentation_projet_mac.pptx
+++ b/documentation/présentation_projet_mac.pptx
@@ -6617,8 +6617,58 @@
               <a:t>Depuis la bd de MongoDB</a:t>
             </a:r>
           </a:p>
-        </p:txBody>
-      </p:sp>
+          <a:p>
+            <a:endParaRPr lang="fr-CH" dirty="0"/>
+          </a:p>
+          <a:p>
+            <a:r>
+              <a:rPr lang="fr-CH" dirty="0"/>
+              <a:t>Ajout </a:t>
+            </a:r>
+            <a:r>
+              <a:rPr lang="fr-CH"/>
+              <a:t>de relation LIKED et ADDED pour les tests</a:t>
+            </a:r>
+            <a:endParaRPr lang="fr-CH" dirty="0"/>
+          </a:p>
+        </p:txBody>
+      </p:sp>
+      <p:pic>
+        <p:nvPicPr>
+          <p:cNvPr id="6" name="Image 5">
+            <a:extLst>
+              <a:ext uri="{FF2B5EF4-FFF2-40B4-BE49-F238E27FC236}">
+                <a16:creationId xmlns:a16="http://schemas.microsoft.com/office/drawing/2014/main" id="{1FFF417D-74E7-4269-AEC5-6C1CAE57A254}"/>
+              </a:ext>
+            </a:extLst>
+          </p:cNvPr>
+          <p:cNvPicPr>
+            <a:picLocks noChangeAspect="1"/>
+          </p:cNvPicPr>
+          <p:nvPr/>
+        </p:nvPicPr>
+        <p:blipFill>
+          <a:blip r:embed="rId2">
+            <a:extLst>
+              <a:ext uri="{28A0092B-C50C-407E-A947-70E740481C1C}">
+                <a14:useLocalDpi xmlns:a14="http://schemas.microsoft.com/office/drawing/2010/main" val="0"/>
+              </a:ext>
+            </a:extLst>
+          </a:blip>
+          <a:stretch>
+            <a:fillRect/>
+          </a:stretch>
+        </p:blipFill>
+        <p:spPr>
+          <a:xfrm>
+            <a:off x="5338878" y="1939070"/>
+            <a:ext cx="3935124" cy="2988531"/>
+          </a:xfrm>
+          <a:prstGeom prst="rect">
+            <a:avLst/>
+          </a:prstGeom>
+        </p:spPr>
+      </p:pic>
     </p:spTree>
     <p:extLst>
       <p:ext uri="{BB962C8B-B14F-4D97-AF65-F5344CB8AC3E}">

</xml_diff>